<commit_message>
Major update to 5510 readings
</commit_message>
<xml_diff>
--- a/clinical-research-methodology/modules/5510-99-objectives.pptx
+++ b/clinical-research-methodology/modules/5510-99-objectives.pptx
@@ -3018,7 +3018,223 @@
             </a:pPr>
             <a:r>
               <a:rPr/>
-              <a:t>To</a:t>
+              <a:t>Research</a:t>
+            </a:r>
+            <a:r>
+              <a:rPr/>
+              <a:t> </a:t>
+            </a:r>
+            <a:r>
+              <a:rPr/>
+              <a:t>must</a:t>
+            </a:r>
+            <a:r>
+              <a:rPr/>
+              <a:t> </a:t>
+            </a:r>
+            <a:r>
+              <a:rPr/>
+              <a:t>meet</a:t>
+            </a:r>
+            <a:r>
+              <a:rPr/>
+              <a:t> </a:t>
+            </a:r>
+            <a:r>
+              <a:rPr/>
+              <a:t>some</a:t>
+            </a:r>
+            <a:r>
+              <a:rPr/>
+              <a:t> </a:t>
+            </a:r>
+            <a:r>
+              <a:rPr/>
+              <a:t>very</a:t>
+            </a:r>
+            <a:r>
+              <a:rPr/>
+              <a:t> </a:t>
+            </a:r>
+            <a:r>
+              <a:rPr/>
+              <a:t>strict</a:t>
+            </a:r>
+            <a:r>
+              <a:rPr/>
+              <a:t> </a:t>
+            </a:r>
+            <a:r>
+              <a:rPr/>
+              <a:t>ethical</a:t>
+            </a:r>
+            <a:r>
+              <a:rPr/>
+              <a:t> </a:t>
+            </a:r>
+            <a:r>
+              <a:rPr/>
+              <a:t>standards.</a:t>
+            </a:r>
+            <a:r>
+              <a:rPr/>
+              <a:t> </a:t>
+            </a:r>
+            <a:r>
+              <a:rPr/>
+              <a:t>You</a:t>
+            </a:r>
+            <a:r>
+              <a:rPr/>
+              <a:t> </a:t>
+            </a:r>
+            <a:r>
+              <a:rPr/>
+              <a:t>need</a:t>
+            </a:r>
+            <a:r>
+              <a:rPr/>
+              <a:t> </a:t>
+            </a:r>
+            <a:r>
+              <a:rPr/>
+              <a:t>to</a:t>
+            </a:r>
+            <a:r>
+              <a:rPr/>
+              <a:t> </a:t>
+            </a:r>
+            <a:r>
+              <a:rPr/>
+              <a:t>think</a:t>
+            </a:r>
+            <a:r>
+              <a:rPr/>
+              <a:t> </a:t>
+            </a:r>
+            <a:r>
+              <a:rPr/>
+              <a:t>about</a:t>
+            </a:r>
+            <a:r>
+              <a:rPr/>
+              <a:t> </a:t>
+            </a:r>
+            <a:r>
+              <a:rPr/>
+              <a:t>this</a:t>
+            </a:r>
+            <a:r>
+              <a:rPr/>
+              <a:t> </a:t>
+            </a:r>
+            <a:r>
+              <a:rPr/>
+              <a:t>as</a:t>
+            </a:r>
+            <a:r>
+              <a:rPr/>
+              <a:t> </a:t>
+            </a:r>
+            <a:r>
+              <a:rPr/>
+              <a:t>you</a:t>
+            </a:r>
+            <a:r>
+              <a:rPr/>
+              <a:t> </a:t>
+            </a:r>
+            <a:r>
+              <a:rPr/>
+              <a:t>plan</a:t>
+            </a:r>
+            <a:r>
+              <a:rPr/>
+              <a:t> </a:t>
+            </a:r>
+            <a:r>
+              <a:rPr/>
+              <a:t>your</a:t>
+            </a:r>
+            <a:r>
+              <a:rPr/>
+              <a:t> </a:t>
+            </a:r>
+            <a:r>
+              <a:rPr/>
+              <a:t>research.</a:t>
+            </a:r>
+            <a:r>
+              <a:rPr/>
+              <a:t> </a:t>
+            </a:r>
+            <a:r>
+              <a:rPr/>
+              <a:t>There</a:t>
+            </a:r>
+            <a:r>
+              <a:rPr/>
+              <a:t> </a:t>
+            </a:r>
+            <a:r>
+              <a:rPr/>
+              <a:t>is</a:t>
+            </a:r>
+            <a:r>
+              <a:rPr/>
+              <a:t> </a:t>
+            </a:r>
+            <a:r>
+              <a:rPr/>
+              <a:t>no</a:t>
+            </a:r>
+            <a:r>
+              <a:rPr/>
+              <a:t> </a:t>
+            </a:r>
+            <a:r>
+              <a:rPr/>
+              <a:t>point</a:t>
+            </a:r>
+            <a:r>
+              <a:rPr/>
+              <a:t> </a:t>
+            </a:r>
+            <a:r>
+              <a:rPr/>
+              <a:t>proposing</a:t>
+            </a:r>
+            <a:r>
+              <a:rPr/>
+              <a:t> </a:t>
+            </a:r>
+            <a:r>
+              <a:rPr/>
+              <a:t>research</a:t>
+            </a:r>
+            <a:r>
+              <a:rPr/>
+              <a:t> </a:t>
+            </a:r>
+            <a:r>
+              <a:rPr/>
+              <a:t>that</a:t>
+            </a:r>
+            <a:r>
+              <a:rPr/>
+              <a:t> </a:t>
+            </a:r>
+            <a:r>
+              <a:rPr/>
+              <a:t>would</a:t>
+            </a:r>
+            <a:r>
+              <a:rPr/>
+              <a:t> </a:t>
+            </a:r>
+            <a:r>
+              <a:rPr/>
+              <a:t>not</a:t>
             </a:r>
             <a:r>
               <a:rPr/>
@@ -3034,7 +3250,1731 @@
             </a:r>
             <a:r>
               <a:rPr/>
-              <a:t>added.</a:t>
+              <a:t>approved</a:t>
+            </a:r>
+            <a:r>
+              <a:rPr/>
+              <a:t> </a:t>
+            </a:r>
+            <a:r>
+              <a:rPr/>
+              <a:t>by</a:t>
+            </a:r>
+            <a:r>
+              <a:rPr/>
+              <a:t> </a:t>
+            </a:r>
+            <a:r>
+              <a:rPr/>
+              <a:t>your</a:t>
+            </a:r>
+            <a:r>
+              <a:rPr/>
+              <a:t> </a:t>
+            </a:r>
+            <a:r>
+              <a:rPr/>
+              <a:t>Institutional</a:t>
+            </a:r>
+            <a:r>
+              <a:rPr/>
+              <a:t> </a:t>
+            </a:r>
+            <a:r>
+              <a:rPr/>
+              <a:t>Review</a:t>
+            </a:r>
+            <a:r>
+              <a:rPr/>
+              <a:t> </a:t>
+            </a:r>
+            <a:r>
+              <a:rPr/>
+              <a:t>Board.</a:t>
+            </a:r>
+            <a:r>
+              <a:rPr/>
+              <a:t> </a:t>
+            </a:r>
+            <a:r>
+              <a:rPr/>
+              <a:t>This</a:t>
+            </a:r>
+            <a:r>
+              <a:rPr/>
+              <a:t> </a:t>
+            </a:r>
+            <a:r>
+              <a:rPr/>
+              <a:t>module</a:t>
+            </a:r>
+            <a:r>
+              <a:rPr/>
+              <a:t> </a:t>
+            </a:r>
+            <a:r>
+              <a:rPr/>
+              <a:t>covers</a:t>
+            </a:r>
+            <a:r>
+              <a:rPr/>
+              <a:t> </a:t>
+            </a:r>
+            <a:r>
+              <a:rPr/>
+              <a:t>the</a:t>
+            </a:r>
+            <a:r>
+              <a:rPr/>
+              <a:t> </a:t>
+            </a:r>
+            <a:r>
+              <a:rPr/>
+              <a:t>historical</a:t>
+            </a:r>
+            <a:r>
+              <a:rPr/>
+              <a:t> </a:t>
+            </a:r>
+            <a:r>
+              <a:rPr/>
+              <a:t>events</a:t>
+            </a:r>
+            <a:r>
+              <a:rPr/>
+              <a:t> </a:t>
+            </a:r>
+            <a:r>
+              <a:rPr/>
+              <a:t>that</a:t>
+            </a:r>
+            <a:r>
+              <a:rPr/>
+              <a:t> </a:t>
+            </a:r>
+            <a:r>
+              <a:rPr/>
+              <a:t>helped</a:t>
+            </a:r>
+            <a:r>
+              <a:rPr/>
+              <a:t> </a:t>
+            </a:r>
+            <a:r>
+              <a:rPr/>
+              <a:t>shape</a:t>
+            </a:r>
+            <a:r>
+              <a:rPr/>
+              <a:t> </a:t>
+            </a:r>
+            <a:r>
+              <a:rPr/>
+              <a:t>how</a:t>
+            </a:r>
+            <a:r>
+              <a:rPr/>
+              <a:t> </a:t>
+            </a:r>
+            <a:r>
+              <a:rPr/>
+              <a:t>we</a:t>
+            </a:r>
+            <a:r>
+              <a:rPr/>
+              <a:t> </a:t>
+            </a:r>
+            <a:r>
+              <a:rPr/>
+              <a:t>perceive</a:t>
+            </a:r>
+            <a:r>
+              <a:rPr/>
+              <a:t> </a:t>
+            </a:r>
+            <a:r>
+              <a:rPr/>
+              <a:t>ethical</a:t>
+            </a:r>
+            <a:r>
+              <a:rPr/>
+              <a:t> </a:t>
+            </a:r>
+            <a:r>
+              <a:rPr/>
+              <a:t>conduct</a:t>
+            </a:r>
+            <a:r>
+              <a:rPr/>
+              <a:t> </a:t>
+            </a:r>
+            <a:r>
+              <a:rPr/>
+              <a:t>of</a:t>
+            </a:r>
+            <a:r>
+              <a:rPr/>
+              <a:t> </a:t>
+            </a:r>
+            <a:r>
+              <a:rPr/>
+              <a:t>research</a:t>
+            </a:r>
+            <a:r>
+              <a:rPr/>
+              <a:t> </a:t>
+            </a:r>
+            <a:r>
+              <a:rPr/>
+              <a:t>today.</a:t>
+            </a:r>
+          </a:p>
+          <a:p>
+            <a:pPr lvl="0" marL="0" indent="0">
+              <a:buNone/>
+            </a:pPr>
+          </a:p>
+          <a:p>
+            <a:pPr lvl="0" marL="0" indent="0">
+              <a:buNone/>
+            </a:pPr>
+            <a:r>
+              <a:rPr/>
+              <a:t>Whistle</a:t>
+            </a:r>
+            <a:r>
+              <a:rPr/>
+              <a:t> </a:t>
+            </a:r>
+            <a:r>
+              <a:rPr/>
+              <a:t>blowing</a:t>
+            </a:r>
+            <a:r>
+              <a:rPr/>
+              <a:t> </a:t>
+            </a:r>
+            <a:r>
+              <a:rPr/>
+              <a:t>is</a:t>
+            </a:r>
+            <a:r>
+              <a:rPr/>
+              <a:t> </a:t>
+            </a:r>
+            <a:r>
+              <a:rPr/>
+              <a:t>a</a:t>
+            </a:r>
+            <a:r>
+              <a:rPr/>
+              <a:t> </a:t>
+            </a:r>
+            <a:r>
+              <a:rPr/>
+              <a:t>term</a:t>
+            </a:r>
+            <a:r>
+              <a:rPr/>
+              <a:t> </a:t>
+            </a:r>
+            <a:r>
+              <a:rPr/>
+              <a:t>describing</a:t>
+            </a:r>
+            <a:r>
+              <a:rPr/>
+              <a:t> </a:t>
+            </a:r>
+            <a:r>
+              <a:rPr/>
+              <a:t>an</a:t>
+            </a:r>
+            <a:r>
+              <a:rPr/>
+              <a:t> </a:t>
+            </a:r>
+            <a:r>
+              <a:rPr/>
+              <a:t>individual</a:t>
+            </a:r>
+            <a:r>
+              <a:rPr/>
+              <a:t> </a:t>
+            </a:r>
+            <a:r>
+              <a:rPr/>
+              <a:t>who</a:t>
+            </a:r>
+            <a:r>
+              <a:rPr/>
+              <a:t> </a:t>
+            </a:r>
+            <a:r>
+              <a:rPr/>
+              <a:t>reveals</a:t>
+            </a:r>
+            <a:r>
+              <a:rPr/>
+              <a:t> </a:t>
+            </a:r>
+            <a:r>
+              <a:rPr/>
+              <a:t>fraud</a:t>
+            </a:r>
+            <a:r>
+              <a:rPr/>
+              <a:t> </a:t>
+            </a:r>
+            <a:r>
+              <a:rPr/>
+              <a:t>(in</a:t>
+            </a:r>
+            <a:r>
+              <a:rPr/>
+              <a:t> </a:t>
+            </a:r>
+            <a:r>
+              <a:rPr/>
+              <a:t>our</a:t>
+            </a:r>
+            <a:r>
+              <a:rPr/>
+              <a:t> </a:t>
+            </a:r>
+            <a:r>
+              <a:rPr/>
+              <a:t>case,</a:t>
+            </a:r>
+            <a:r>
+              <a:rPr/>
+              <a:t> </a:t>
+            </a:r>
+            <a:r>
+              <a:rPr/>
+              <a:t>research</a:t>
+            </a:r>
+            <a:r>
+              <a:rPr/>
+              <a:t> </a:t>
+            </a:r>
+            <a:r>
+              <a:rPr/>
+              <a:t>fraud)</a:t>
+            </a:r>
+            <a:r>
+              <a:rPr/>
+              <a:t> </a:t>
+            </a:r>
+            <a:r>
+              <a:rPr/>
+              <a:t>in</a:t>
+            </a:r>
+            <a:r>
+              <a:rPr/>
+              <a:t> </a:t>
+            </a:r>
+            <a:r>
+              <a:rPr/>
+              <a:t>an</a:t>
+            </a:r>
+            <a:r>
+              <a:rPr/>
+              <a:t> </a:t>
+            </a:r>
+            <a:r>
+              <a:rPr/>
+              <a:t>organization.</a:t>
+            </a:r>
+            <a:r>
+              <a:rPr/>
+              <a:t> </a:t>
+            </a:r>
+            <a:r>
+              <a:rPr/>
+              <a:t>If</a:t>
+            </a:r>
+            <a:r>
+              <a:rPr/>
+              <a:t> </a:t>
+            </a:r>
+            <a:r>
+              <a:rPr/>
+              <a:t>you</a:t>
+            </a:r>
+            <a:r>
+              <a:rPr/>
+              <a:t> </a:t>
+            </a:r>
+            <a:r>
+              <a:rPr/>
+              <a:t>encounter</a:t>
+            </a:r>
+            <a:r>
+              <a:rPr/>
+              <a:t> </a:t>
+            </a:r>
+            <a:r>
+              <a:rPr/>
+              <a:t>work</a:t>
+            </a:r>
+            <a:r>
+              <a:rPr/>
+              <a:t> </a:t>
+            </a:r>
+            <a:r>
+              <a:rPr/>
+              <a:t>that</a:t>
+            </a:r>
+            <a:r>
+              <a:rPr/>
+              <a:t> </a:t>
+            </a:r>
+            <a:r>
+              <a:rPr/>
+              <a:t>you</a:t>
+            </a:r>
+            <a:r>
+              <a:rPr/>
+              <a:t> </a:t>
+            </a:r>
+            <a:r>
+              <a:rPr/>
+              <a:t>perceive</a:t>
+            </a:r>
+            <a:r>
+              <a:rPr/>
+              <a:t> </a:t>
+            </a:r>
+            <a:r>
+              <a:rPr/>
+              <a:t>to</a:t>
+            </a:r>
+            <a:r>
+              <a:rPr/>
+              <a:t> </a:t>
+            </a:r>
+            <a:r>
+              <a:rPr/>
+              <a:t>be</a:t>
+            </a:r>
+            <a:r>
+              <a:rPr/>
+              <a:t> </a:t>
+            </a:r>
+            <a:r>
+              <a:rPr/>
+              <a:t>research</a:t>
+            </a:r>
+            <a:r>
+              <a:rPr/>
+              <a:t> </a:t>
+            </a:r>
+            <a:r>
+              <a:rPr/>
+              <a:t>fraud,</a:t>
+            </a:r>
+            <a:r>
+              <a:rPr/>
+              <a:t> </a:t>
+            </a:r>
+            <a:r>
+              <a:rPr/>
+              <a:t>you</a:t>
+            </a:r>
+            <a:r>
+              <a:rPr/>
+              <a:t> </a:t>
+            </a:r>
+            <a:r>
+              <a:rPr/>
+              <a:t>have</a:t>
+            </a:r>
+            <a:r>
+              <a:rPr/>
+              <a:t> </a:t>
+            </a:r>
+            <a:r>
+              <a:rPr/>
+              <a:t>several</a:t>
+            </a:r>
+            <a:r>
+              <a:rPr/>
+              <a:t> </a:t>
+            </a:r>
+            <a:r>
+              <a:rPr/>
+              <a:t>avenues</a:t>
+            </a:r>
+            <a:r>
+              <a:rPr/>
+              <a:t> </a:t>
+            </a:r>
+            <a:r>
+              <a:rPr/>
+              <a:t>that</a:t>
+            </a:r>
+            <a:r>
+              <a:rPr/>
+              <a:t> </a:t>
+            </a:r>
+            <a:r>
+              <a:rPr/>
+              <a:t>you</a:t>
+            </a:r>
+            <a:r>
+              <a:rPr/>
+              <a:t> </a:t>
+            </a:r>
+            <a:r>
+              <a:rPr/>
+              <a:t>can</a:t>
+            </a:r>
+            <a:r>
+              <a:rPr/>
+              <a:t> </a:t>
+            </a:r>
+            <a:r>
+              <a:rPr/>
+              <a:t>pursue</a:t>
+            </a:r>
+            <a:r>
+              <a:rPr/>
+              <a:t> </a:t>
+            </a:r>
+            <a:r>
+              <a:rPr/>
+              <a:t>to</a:t>
+            </a:r>
+            <a:r>
+              <a:rPr/>
+              <a:t> </a:t>
+            </a:r>
+            <a:r>
+              <a:rPr/>
+              <a:t>report</a:t>
+            </a:r>
+            <a:r>
+              <a:rPr/>
+              <a:t> </a:t>
+            </a:r>
+            <a:r>
+              <a:rPr/>
+              <a:t>this</a:t>
+            </a:r>
+            <a:r>
+              <a:rPr/>
+              <a:t> </a:t>
+            </a:r>
+            <a:r>
+              <a:rPr/>
+              <a:t>fraud.</a:t>
+            </a:r>
+            <a:r>
+              <a:rPr/>
+              <a:t> </a:t>
+            </a:r>
+            <a:r>
+              <a:rPr/>
+              <a:t>This</a:t>
+            </a:r>
+            <a:r>
+              <a:rPr/>
+              <a:t> </a:t>
+            </a:r>
+            <a:r>
+              <a:rPr/>
+              <a:t>module</a:t>
+            </a:r>
+            <a:r>
+              <a:rPr/>
+              <a:t> </a:t>
+            </a:r>
+            <a:r>
+              <a:rPr/>
+              <a:t>will</a:t>
+            </a:r>
+            <a:r>
+              <a:rPr/>
+              <a:t> </a:t>
+            </a:r>
+            <a:r>
+              <a:rPr/>
+              <a:t>include</a:t>
+            </a:r>
+            <a:r>
+              <a:rPr/>
+              <a:t> </a:t>
+            </a:r>
+            <a:r>
+              <a:rPr/>
+              <a:t>discussion</a:t>
+            </a:r>
+            <a:r>
+              <a:rPr/>
+              <a:t> </a:t>
+            </a:r>
+            <a:r>
+              <a:rPr/>
+              <a:t>of</a:t>
+            </a:r>
+            <a:r>
+              <a:rPr/>
+              <a:t> </a:t>
+            </a:r>
+            <a:r>
+              <a:rPr/>
+              <a:t>actual</a:t>
+            </a:r>
+            <a:r>
+              <a:rPr/>
+              <a:t> </a:t>
+            </a:r>
+            <a:r>
+              <a:rPr/>
+              <a:t>cases</a:t>
+            </a:r>
+            <a:r>
+              <a:rPr/>
+              <a:t> </a:t>
+            </a:r>
+            <a:r>
+              <a:rPr/>
+              <a:t>of</a:t>
+            </a:r>
+            <a:r>
+              <a:rPr/>
+              <a:t> </a:t>
+            </a:r>
+            <a:r>
+              <a:rPr/>
+              <a:t>whistle</a:t>
+            </a:r>
+            <a:r>
+              <a:rPr/>
+              <a:t> </a:t>
+            </a:r>
+            <a:r>
+              <a:rPr/>
+              <a:t>blowing.</a:t>
+            </a:r>
+          </a:p>
+          <a:p>
+            <a:pPr lvl="0" marL="0" indent="0">
+              <a:buNone/>
+            </a:pPr>
+          </a:p>
+          <a:p>
+            <a:pPr lvl="0" marL="0" indent="0">
+              <a:buNone/>
+            </a:pPr>
+            <a:r>
+              <a:rPr/>
+              <a:t>Start</a:t>
+            </a:r>
+            <a:r>
+              <a:rPr/>
+              <a:t> </a:t>
+            </a:r>
+            <a:r>
+              <a:rPr/>
+              <a:t>thinking</a:t>
+            </a:r>
+            <a:r>
+              <a:rPr/>
+              <a:t> </a:t>
+            </a:r>
+            <a:r>
+              <a:rPr/>
+              <a:t>about</a:t>
+            </a:r>
+            <a:r>
+              <a:rPr/>
+              <a:t> </a:t>
+            </a:r>
+            <a:r>
+              <a:rPr/>
+              <a:t>a</a:t>
+            </a:r>
+            <a:r>
+              <a:rPr/>
+              <a:t> </a:t>
+            </a:r>
+            <a:r>
+              <a:rPr/>
+              <a:t>research</a:t>
+            </a:r>
+            <a:r>
+              <a:rPr/>
+              <a:t> </a:t>
+            </a:r>
+            <a:r>
+              <a:rPr/>
+              <a:t>problem</a:t>
+            </a:r>
+            <a:r>
+              <a:rPr/>
+              <a:t> </a:t>
+            </a:r>
+            <a:r>
+              <a:rPr/>
+              <a:t>that</a:t>
+            </a:r>
+            <a:r>
+              <a:rPr/>
+              <a:t> </a:t>
+            </a:r>
+            <a:r>
+              <a:rPr/>
+              <a:t>you</a:t>
+            </a:r>
+            <a:r>
+              <a:rPr/>
+              <a:t> </a:t>
+            </a:r>
+            <a:r>
+              <a:rPr/>
+              <a:t>might</a:t>
+            </a:r>
+            <a:r>
+              <a:rPr/>
+              <a:t> </a:t>
+            </a:r>
+            <a:r>
+              <a:rPr/>
+              <a:t>want</a:t>
+            </a:r>
+            <a:r>
+              <a:rPr/>
+              <a:t> </a:t>
+            </a:r>
+            <a:r>
+              <a:rPr/>
+              <a:t>to</a:t>
+            </a:r>
+            <a:r>
+              <a:rPr/>
+              <a:t> </a:t>
+            </a:r>
+            <a:r>
+              <a:rPr/>
+              <a:t>develop</a:t>
+            </a:r>
+            <a:r>
+              <a:rPr/>
+              <a:t> </a:t>
+            </a:r>
+            <a:r>
+              <a:rPr/>
+              <a:t>a</a:t>
+            </a:r>
+            <a:r>
+              <a:rPr/>
+              <a:t> </a:t>
+            </a:r>
+            <a:r>
+              <a:rPr/>
+              <a:t>research</a:t>
+            </a:r>
+            <a:r>
+              <a:rPr/>
+              <a:t> </a:t>
+            </a:r>
+            <a:r>
+              <a:rPr/>
+              <a:t>plan</a:t>
+            </a:r>
+            <a:r>
+              <a:rPr/>
+              <a:t> </a:t>
+            </a:r>
+            <a:r>
+              <a:rPr/>
+              <a:t>for.</a:t>
+            </a:r>
+            <a:r>
+              <a:rPr/>
+              <a:t> </a:t>
+            </a:r>
+            <a:r>
+              <a:rPr/>
+              <a:t>It</a:t>
+            </a:r>
+            <a:r>
+              <a:rPr/>
+              <a:t> </a:t>
+            </a:r>
+            <a:r>
+              <a:rPr/>
+              <a:t>could</a:t>
+            </a:r>
+            <a:r>
+              <a:rPr/>
+              <a:t> </a:t>
+            </a:r>
+            <a:r>
+              <a:rPr/>
+              <a:t>be</a:t>
+            </a:r>
+            <a:r>
+              <a:rPr/>
+              <a:t> </a:t>
+            </a:r>
+            <a:r>
+              <a:rPr/>
+              <a:t>what</a:t>
+            </a:r>
+            <a:r>
+              <a:rPr/>
+              <a:t> </a:t>
+            </a:r>
+            <a:r>
+              <a:rPr/>
+              <a:t>you</a:t>
+            </a:r>
+            <a:r>
+              <a:rPr/>
+              <a:t> </a:t>
+            </a:r>
+            <a:r>
+              <a:rPr/>
+              <a:t>anticipate</a:t>
+            </a:r>
+            <a:r>
+              <a:rPr/>
+              <a:t> </a:t>
+            </a:r>
+            <a:r>
+              <a:rPr/>
+              <a:t>you</a:t>
+            </a:r>
+            <a:r>
+              <a:rPr/>
+              <a:t> </a:t>
+            </a:r>
+            <a:r>
+              <a:rPr/>
+              <a:t>working</a:t>
+            </a:r>
+            <a:r>
+              <a:rPr/>
+              <a:t> </a:t>
+            </a:r>
+            <a:r>
+              <a:rPr/>
+              <a:t>on</a:t>
+            </a:r>
+            <a:r>
+              <a:rPr/>
+              <a:t> </a:t>
+            </a:r>
+            <a:r>
+              <a:rPr/>
+              <a:t>when</a:t>
+            </a:r>
+            <a:r>
+              <a:rPr/>
+              <a:t> </a:t>
+            </a:r>
+            <a:r>
+              <a:rPr/>
+              <a:t>you</a:t>
+            </a:r>
+            <a:r>
+              <a:rPr/>
+              <a:t> </a:t>
+            </a:r>
+            <a:r>
+              <a:rPr/>
+              <a:t>get</a:t>
+            </a:r>
+            <a:r>
+              <a:rPr/>
+              <a:t> </a:t>
+            </a:r>
+            <a:r>
+              <a:rPr/>
+              <a:t>to</a:t>
+            </a:r>
+            <a:r>
+              <a:rPr/>
+              <a:t> </a:t>
+            </a:r>
+            <a:r>
+              <a:rPr/>
+              <a:t>your</a:t>
+            </a:r>
+            <a:r>
+              <a:rPr/>
+              <a:t> </a:t>
+            </a:r>
+            <a:r>
+              <a:rPr/>
+              <a:t>capstone</a:t>
+            </a:r>
+            <a:r>
+              <a:rPr/>
+              <a:t> </a:t>
+            </a:r>
+            <a:r>
+              <a:rPr/>
+              <a:t>project,</a:t>
+            </a:r>
+            <a:r>
+              <a:rPr/>
+              <a:t> </a:t>
+            </a:r>
+            <a:r>
+              <a:rPr/>
+              <a:t>thesis,</a:t>
+            </a:r>
+            <a:r>
+              <a:rPr/>
+              <a:t> </a:t>
+            </a:r>
+            <a:r>
+              <a:rPr/>
+              <a:t>or</a:t>
+            </a:r>
+            <a:r>
+              <a:rPr/>
+              <a:t> </a:t>
+            </a:r>
+            <a:r>
+              <a:rPr/>
+              <a:t>dissertation.</a:t>
+            </a:r>
+            <a:r>
+              <a:rPr/>
+              <a:t> </a:t>
+            </a:r>
+            <a:r>
+              <a:rPr/>
+              <a:t>But</a:t>
+            </a:r>
+            <a:r>
+              <a:rPr/>
+              <a:t> </a:t>
+            </a:r>
+            <a:r>
+              <a:rPr/>
+              <a:t>if</a:t>
+            </a:r>
+            <a:r>
+              <a:rPr/>
+              <a:t> </a:t>
+            </a:r>
+            <a:r>
+              <a:rPr/>
+              <a:t>you</a:t>
+            </a:r>
+            <a:r>
+              <a:rPr/>
+              <a:t> </a:t>
+            </a:r>
+            <a:r>
+              <a:rPr/>
+              <a:t>don’t</a:t>
+            </a:r>
+            <a:r>
+              <a:rPr/>
+              <a:t> </a:t>
+            </a:r>
+            <a:r>
+              <a:rPr/>
+              <a:t>know</a:t>
+            </a:r>
+            <a:r>
+              <a:rPr/>
+              <a:t> </a:t>
+            </a:r>
+            <a:r>
+              <a:rPr/>
+              <a:t>yet</a:t>
+            </a:r>
+            <a:r>
+              <a:rPr/>
+              <a:t> </a:t>
+            </a:r>
+            <a:r>
+              <a:rPr/>
+              <a:t>what</a:t>
+            </a:r>
+            <a:r>
+              <a:rPr/>
+              <a:t> </a:t>
+            </a:r>
+            <a:r>
+              <a:rPr/>
+              <a:t>you</a:t>
+            </a:r>
+            <a:r>
+              <a:rPr/>
+              <a:t> </a:t>
+            </a:r>
+            <a:r>
+              <a:rPr/>
+              <a:t>plan</a:t>
+            </a:r>
+            <a:r>
+              <a:rPr/>
+              <a:t> </a:t>
+            </a:r>
+            <a:r>
+              <a:rPr/>
+              <a:t>to</a:t>
+            </a:r>
+            <a:r>
+              <a:rPr/>
+              <a:t> </a:t>
+            </a:r>
+            <a:r>
+              <a:rPr/>
+              <a:t>work</a:t>
+            </a:r>
+            <a:r>
+              <a:rPr/>
+              <a:t> </a:t>
+            </a:r>
+            <a:r>
+              <a:rPr/>
+              <a:t>on,</a:t>
+            </a:r>
+            <a:r>
+              <a:rPr/>
+              <a:t> </a:t>
+            </a:r>
+            <a:r>
+              <a:rPr/>
+              <a:t>or</a:t>
+            </a:r>
+            <a:r>
+              <a:rPr/>
+              <a:t> </a:t>
+            </a:r>
+            <a:r>
+              <a:rPr/>
+              <a:t>if</a:t>
+            </a:r>
+            <a:r>
+              <a:rPr/>
+              <a:t> </a:t>
+            </a:r>
+            <a:r>
+              <a:rPr/>
+              <a:t>your</a:t>
+            </a:r>
+            <a:r>
+              <a:rPr/>
+              <a:t> </a:t>
+            </a:r>
+            <a:r>
+              <a:rPr/>
+              <a:t>degree</a:t>
+            </a:r>
+            <a:r>
+              <a:rPr/>
+              <a:t> </a:t>
+            </a:r>
+            <a:r>
+              <a:rPr/>
+              <a:t>program</a:t>
+            </a:r>
+            <a:r>
+              <a:rPr/>
+              <a:t> </a:t>
+            </a:r>
+            <a:r>
+              <a:rPr/>
+              <a:t>does</a:t>
+            </a:r>
+            <a:r>
+              <a:rPr/>
+              <a:t> </a:t>
+            </a:r>
+            <a:r>
+              <a:rPr/>
+              <a:t>not</a:t>
+            </a:r>
+            <a:r>
+              <a:rPr/>
+              <a:t> </a:t>
+            </a:r>
+            <a:r>
+              <a:rPr/>
+              <a:t>require</a:t>
+            </a:r>
+            <a:r>
+              <a:rPr/>
+              <a:t> </a:t>
+            </a:r>
+            <a:r>
+              <a:rPr/>
+              <a:t>a</a:t>
+            </a:r>
+            <a:r>
+              <a:rPr/>
+              <a:t> </a:t>
+            </a:r>
+            <a:r>
+              <a:rPr/>
+              <a:t>capstone,</a:t>
+            </a:r>
+            <a:r>
+              <a:rPr/>
+              <a:t> </a:t>
+            </a:r>
+            <a:r>
+              <a:rPr/>
+              <a:t>thesis,</a:t>
+            </a:r>
+            <a:r>
+              <a:rPr/>
+              <a:t> </a:t>
+            </a:r>
+            <a:r>
+              <a:rPr/>
+              <a:t>or</a:t>
+            </a:r>
+            <a:r>
+              <a:rPr/>
+              <a:t> </a:t>
+            </a:r>
+            <a:r>
+              <a:rPr/>
+              <a:t>dissertation,</a:t>
+            </a:r>
+            <a:r>
+              <a:rPr/>
+              <a:t> </a:t>
+            </a:r>
+            <a:r>
+              <a:rPr/>
+              <a:t>just</a:t>
+            </a:r>
+            <a:r>
+              <a:rPr/>
+              <a:t> </a:t>
+            </a:r>
+            <a:r>
+              <a:rPr/>
+              <a:t>pick</a:t>
+            </a:r>
+            <a:r>
+              <a:rPr/>
+              <a:t> </a:t>
+            </a:r>
+            <a:r>
+              <a:rPr/>
+              <a:t>a</a:t>
+            </a:r>
+            <a:r>
+              <a:rPr/>
+              <a:t> </a:t>
+            </a:r>
+            <a:r>
+              <a:rPr/>
+              <a:t>topic</a:t>
+            </a:r>
+            <a:r>
+              <a:rPr/>
+              <a:t> </a:t>
+            </a:r>
+            <a:r>
+              <a:rPr/>
+              <a:t>that</a:t>
+            </a:r>
+            <a:r>
+              <a:rPr/>
+              <a:t> </a:t>
+            </a:r>
+            <a:r>
+              <a:rPr/>
+              <a:t>think</a:t>
+            </a:r>
+            <a:r>
+              <a:rPr/>
+              <a:t> </a:t>
+            </a:r>
+            <a:r>
+              <a:rPr/>
+              <a:t>would</a:t>
+            </a:r>
+            <a:r>
+              <a:rPr/>
+              <a:t> </a:t>
+            </a:r>
+            <a:r>
+              <a:rPr/>
+              <a:t>be</a:t>
+            </a:r>
+            <a:r>
+              <a:rPr/>
+              <a:t> </a:t>
+            </a:r>
+            <a:r>
+              <a:rPr/>
+              <a:t>fun</a:t>
+            </a:r>
+            <a:r>
+              <a:rPr/>
+              <a:t> </a:t>
+            </a:r>
+            <a:r>
+              <a:rPr/>
+              <a:t>and</a:t>
+            </a:r>
+            <a:r>
+              <a:rPr/>
+              <a:t> </a:t>
+            </a:r>
+            <a:r>
+              <a:rPr/>
+              <a:t>interesting</a:t>
+            </a:r>
+            <a:r>
+              <a:rPr/>
+              <a:t> </a:t>
+            </a:r>
+            <a:r>
+              <a:rPr/>
+              <a:t>to</a:t>
+            </a:r>
+            <a:r>
+              <a:rPr/>
+              <a:t> </a:t>
+            </a:r>
+            <a:r>
+              <a:rPr/>
+              <a:t>explore.</a:t>
+            </a:r>
+            <a:r>
+              <a:rPr/>
+              <a:t> </a:t>
+            </a:r>
+            <a:r>
+              <a:rPr/>
+              <a:t>By</a:t>
+            </a:r>
+            <a:r>
+              <a:rPr/>
+              <a:t> </a:t>
+            </a:r>
+            <a:r>
+              <a:rPr/>
+              <a:t>the</a:t>
+            </a:r>
+            <a:r>
+              <a:rPr/>
+              <a:t> </a:t>
+            </a:r>
+            <a:r>
+              <a:rPr/>
+              <a:t>middle</a:t>
+            </a:r>
+            <a:r>
+              <a:rPr/>
+              <a:t> </a:t>
+            </a:r>
+            <a:r>
+              <a:rPr/>
+              <a:t>of</a:t>
+            </a:r>
+            <a:r>
+              <a:rPr/>
+              <a:t> </a:t>
+            </a:r>
+            <a:r>
+              <a:rPr/>
+              <a:t>the</a:t>
+            </a:r>
+            <a:r>
+              <a:rPr/>
+              <a:t> </a:t>
+            </a:r>
+            <a:r>
+              <a:rPr/>
+              <a:t>semester,</a:t>
+            </a:r>
+            <a:r>
+              <a:rPr/>
+              <a:t> </a:t>
+            </a:r>
+            <a:r>
+              <a:rPr/>
+              <a:t>I</a:t>
+            </a:r>
+            <a:r>
+              <a:rPr/>
+              <a:t> </a:t>
+            </a:r>
+            <a:r>
+              <a:rPr/>
+              <a:t>need</a:t>
+            </a:r>
+            <a:r>
+              <a:rPr/>
+              <a:t> </a:t>
+            </a:r>
+            <a:r>
+              <a:rPr/>
+              <a:t>you</a:t>
+            </a:r>
+            <a:r>
+              <a:rPr/>
+              <a:t> </a:t>
+            </a:r>
+            <a:r>
+              <a:rPr/>
+              <a:t>to</a:t>
+            </a:r>
+            <a:r>
+              <a:rPr/>
+              <a:t> </a:t>
+            </a:r>
+            <a:r>
+              <a:rPr/>
+              <a:t>produce</a:t>
+            </a:r>
+            <a:r>
+              <a:rPr/>
+              <a:t> </a:t>
+            </a:r>
+            <a:r>
+              <a:rPr/>
+              <a:t>a</a:t>
+            </a:r>
+            <a:r>
+              <a:rPr/>
+              <a:t> </a:t>
+            </a:r>
+            <a:r>
+              <a:rPr/>
+              <a:t>literature</a:t>
+            </a:r>
+            <a:r>
+              <a:rPr/>
+              <a:t> </a:t>
+            </a:r>
+            <a:r>
+              <a:rPr/>
+              <a:t>review</a:t>
+            </a:r>
+            <a:r>
+              <a:rPr/>
+              <a:t> </a:t>
+            </a:r>
+            <a:r>
+              <a:rPr/>
+              <a:t>associated</a:t>
+            </a:r>
+            <a:r>
+              <a:rPr/>
+              <a:t> </a:t>
+            </a:r>
+            <a:r>
+              <a:rPr/>
+              <a:t>with</a:t>
+            </a:r>
+            <a:r>
+              <a:rPr/>
+              <a:t> </a:t>
+            </a:r>
+            <a:r>
+              <a:rPr/>
+              <a:t>your</a:t>
+            </a:r>
+            <a:r>
+              <a:rPr/>
+              <a:t> </a:t>
+            </a:r>
+            <a:r>
+              <a:rPr/>
+              <a:t>research</a:t>
+            </a:r>
+            <a:r>
+              <a:rPr/>
+              <a:t> </a:t>
+            </a:r>
+            <a:r>
+              <a:rPr/>
+              <a:t>problem.</a:t>
+            </a:r>
+            <a:r>
+              <a:rPr/>
+              <a:t> </a:t>
+            </a:r>
+            <a:r>
+              <a:rPr/>
+              <a:t>By</a:t>
+            </a:r>
+            <a:r>
+              <a:rPr/>
+              <a:t> </a:t>
+            </a:r>
+            <a:r>
+              <a:rPr/>
+              <a:t>the</a:t>
+            </a:r>
+            <a:r>
+              <a:rPr/>
+              <a:t> </a:t>
+            </a:r>
+            <a:r>
+              <a:rPr/>
+              <a:t>end</a:t>
+            </a:r>
+            <a:r>
+              <a:rPr/>
+              <a:t> </a:t>
+            </a:r>
+            <a:r>
+              <a:rPr/>
+              <a:t>of</a:t>
+            </a:r>
+            <a:r>
+              <a:rPr/>
+              <a:t> </a:t>
+            </a:r>
+            <a:r>
+              <a:rPr/>
+              <a:t>the</a:t>
+            </a:r>
+            <a:r>
+              <a:rPr/>
+              <a:t> </a:t>
+            </a:r>
+            <a:r>
+              <a:rPr/>
+              <a:t>semester,</a:t>
+            </a:r>
+            <a:r>
+              <a:rPr/>
+              <a:t> </a:t>
+            </a:r>
+            <a:r>
+              <a:rPr/>
+              <a:t>I</a:t>
+            </a:r>
+            <a:r>
+              <a:rPr/>
+              <a:t> </a:t>
+            </a:r>
+            <a:r>
+              <a:rPr/>
+              <a:t>need</a:t>
+            </a:r>
+            <a:r>
+              <a:rPr/>
+              <a:t> </a:t>
+            </a:r>
+            <a:r>
+              <a:rPr/>
+              <a:t>you</a:t>
+            </a:r>
+            <a:r>
+              <a:rPr/>
+              <a:t> </a:t>
+            </a:r>
+            <a:r>
+              <a:rPr/>
+              <a:t>to</a:t>
+            </a:r>
+            <a:r>
+              <a:rPr/>
+              <a:t> </a:t>
+            </a:r>
+            <a:r>
+              <a:rPr/>
+              <a:t>produce</a:t>
+            </a:r>
+            <a:r>
+              <a:rPr/>
+              <a:t> </a:t>
+            </a:r>
+            <a:r>
+              <a:rPr/>
+              <a:t>an</a:t>
+            </a:r>
+            <a:r>
+              <a:rPr/>
+              <a:t> </a:t>
+            </a:r>
+            <a:r>
+              <a:rPr/>
+              <a:t>updated</a:t>
+            </a:r>
+            <a:r>
+              <a:rPr/>
+              <a:t> </a:t>
+            </a:r>
+            <a:r>
+              <a:rPr/>
+              <a:t>literature</a:t>
+            </a:r>
+            <a:r>
+              <a:rPr/>
+              <a:t> </a:t>
+            </a:r>
+            <a:r>
+              <a:rPr/>
+              <a:t>review,</a:t>
+            </a:r>
+            <a:r>
+              <a:rPr/>
+              <a:t> </a:t>
+            </a:r>
+            <a:r>
+              <a:rPr/>
+              <a:t>based</a:t>
+            </a:r>
+            <a:r>
+              <a:rPr/>
+              <a:t> </a:t>
+            </a:r>
+            <a:r>
+              <a:rPr/>
+              <a:t>on</a:t>
+            </a:r>
+            <a:r>
+              <a:rPr/>
+              <a:t> </a:t>
+            </a:r>
+            <a:r>
+              <a:rPr/>
+              <a:t>the</a:t>
+            </a:r>
+            <a:r>
+              <a:rPr/>
+              <a:t> </a:t>
+            </a:r>
+            <a:r>
+              <a:rPr/>
+              <a:t>feedback</a:t>
+            </a:r>
+            <a:r>
+              <a:rPr/>
+              <a:t> </a:t>
+            </a:r>
+            <a:r>
+              <a:rPr/>
+              <a:t>that</a:t>
+            </a:r>
+            <a:r>
+              <a:rPr/>
+              <a:t> </a:t>
+            </a:r>
+            <a:r>
+              <a:rPr/>
+              <a:t>you</a:t>
+            </a:r>
+            <a:r>
+              <a:rPr/>
+              <a:t> </a:t>
+            </a:r>
+            <a:r>
+              <a:rPr/>
+              <a:t>get</a:t>
+            </a:r>
+            <a:r>
+              <a:rPr/>
+              <a:t> </a:t>
+            </a:r>
+            <a:r>
+              <a:rPr/>
+              <a:t>plus</a:t>
+            </a:r>
+            <a:r>
+              <a:rPr/>
+              <a:t> </a:t>
+            </a:r>
+            <a:r>
+              <a:rPr/>
+              <a:t>a</a:t>
+            </a:r>
+            <a:r>
+              <a:rPr/>
+              <a:t> </a:t>
+            </a:r>
+            <a:r>
+              <a:rPr/>
+              <a:t>methods</a:t>
+            </a:r>
+            <a:r>
+              <a:rPr/>
+              <a:t> </a:t>
+            </a:r>
+            <a:r>
+              <a:rPr/>
+              <a:t>section.</a:t>
+            </a:r>
+            <a:r>
+              <a:rPr/>
+              <a:t> </a:t>
+            </a:r>
+            <a:r>
+              <a:rPr/>
+              <a:t>These</a:t>
+            </a:r>
+            <a:r>
+              <a:rPr/>
+              <a:t> </a:t>
+            </a:r>
+            <a:r>
+              <a:rPr/>
+              <a:t>two</a:t>
+            </a:r>
+            <a:r>
+              <a:rPr/>
+              <a:t> </a:t>
+            </a:r>
+            <a:r>
+              <a:rPr/>
+              <a:t>assignments</a:t>
+            </a:r>
+            <a:r>
+              <a:rPr/>
+              <a:t> </a:t>
+            </a:r>
+            <a:r>
+              <a:rPr/>
+              <a:t>will</a:t>
+            </a:r>
+            <a:r>
+              <a:rPr/>
+              <a:t> </a:t>
+            </a:r>
+            <a:r>
+              <a:rPr/>
+              <a:t>form</a:t>
+            </a:r>
+            <a:r>
+              <a:rPr/>
+              <a:t> </a:t>
+            </a:r>
+            <a:r>
+              <a:rPr/>
+              <a:t>the</a:t>
+            </a:r>
+            <a:r>
+              <a:rPr/>
+              <a:t> </a:t>
+            </a:r>
+            <a:r>
+              <a:rPr/>
+              <a:t>bulk</a:t>
+            </a:r>
+            <a:r>
+              <a:rPr/>
+              <a:t> </a:t>
+            </a:r>
+            <a:r>
+              <a:rPr/>
+              <a:t>of</a:t>
+            </a:r>
+            <a:r>
+              <a:rPr/>
+              <a:t> </a:t>
+            </a:r>
+            <a:r>
+              <a:rPr/>
+              <a:t>your</a:t>
+            </a:r>
+            <a:r>
+              <a:rPr/>
+              <a:t> </a:t>
+            </a:r>
+            <a:r>
+              <a:rPr/>
+              <a:t>grade.</a:t>
+            </a:r>
+            <a:r>
+              <a:rPr/>
+              <a:t> </a:t>
+            </a:r>
+            <a:r>
+              <a:rPr/>
+              <a:t>You</a:t>
+            </a:r>
+            <a:r>
+              <a:rPr/>
+              <a:t> </a:t>
+            </a:r>
+            <a:r>
+              <a:rPr/>
+              <a:t>will</a:t>
+            </a:r>
+            <a:r>
+              <a:rPr/>
+              <a:t> </a:t>
+            </a:r>
+            <a:r>
+              <a:rPr/>
+              <a:t>hear</a:t>
+            </a:r>
+            <a:r>
+              <a:rPr/>
+              <a:t> </a:t>
+            </a:r>
+            <a:r>
+              <a:rPr/>
+              <a:t>more</a:t>
+            </a:r>
+            <a:r>
+              <a:rPr/>
+              <a:t> </a:t>
+            </a:r>
+            <a:r>
+              <a:rPr/>
+              <a:t>about</a:t>
+            </a:r>
+            <a:r>
+              <a:rPr/>
+              <a:t> </a:t>
+            </a:r>
+            <a:r>
+              <a:rPr/>
+              <a:t>these</a:t>
+            </a:r>
+            <a:r>
+              <a:rPr/>
+              <a:t> </a:t>
+            </a:r>
+            <a:r>
+              <a:rPr/>
+              <a:t>assignments</a:t>
+            </a:r>
+            <a:r>
+              <a:rPr/>
+              <a:t> </a:t>
+            </a:r>
+            <a:r>
+              <a:rPr/>
+              <a:t>in</a:t>
+            </a:r>
+            <a:r>
+              <a:rPr/>
+              <a:t> </a:t>
+            </a:r>
+            <a:r>
+              <a:rPr/>
+              <a:t>the</a:t>
+            </a:r>
+            <a:r>
+              <a:rPr/>
+              <a:t> </a:t>
+            </a:r>
+            <a:r>
+              <a:rPr/>
+              <a:t>upcoming</a:t>
+            </a:r>
+            <a:r>
+              <a:rPr/>
+              <a:t> </a:t>
+            </a:r>
+            <a:r>
+              <a:rPr/>
+              <a:t>weeks.</a:t>
             </a:r>
           </a:p>
         </p:txBody>

</xml_diff>